<commit_message>
Alteraçao da GUI Principal
</commit_message>
<xml_diff>
--- a/Gerenciador/src/Imagens/BackgroudLogin.pptx
+++ b/Gerenciador/src/Imagens/BackgroudLogin.pptx
@@ -9,12 +9,11 @@
     <p:sldId id="259" r:id="rId3"/>
     <p:sldId id="267" r:id="rId4"/>
     <p:sldId id="268" r:id="rId5"/>
-    <p:sldId id="263" r:id="rId6"/>
-    <p:sldId id="262" r:id="rId7"/>
-    <p:sldId id="264" r:id="rId8"/>
-    <p:sldId id="265" r:id="rId9"/>
-    <p:sldId id="266" r:id="rId10"/>
-    <p:sldId id="260" r:id="rId11"/>
+    <p:sldId id="262" r:id="rId6"/>
+    <p:sldId id="264" r:id="rId7"/>
+    <p:sldId id="265" r:id="rId8"/>
+    <p:sldId id="266" r:id="rId9"/>
+    <p:sldId id="260" r:id="rId10"/>
   </p:sldIdLst>
   <p:sldSz cx="12192000" cy="6858000"/>
   <p:notesSz cx="6858000" cy="9144000"/>
@@ -263,7 +262,7 @@
           <a:p>
             <a:fld id="{AD1AA28E-6C04-4118-9F0B-62AFCDC37ADA}" type="datetimeFigureOut">
               <a:rPr lang="pt-BR" smtClean="0"/>
-              <a:t>27/05/2015</a:t>
+              <a:t>02/06/2015</a:t>
             </a:fld>
             <a:endParaRPr lang="pt-BR"/>
           </a:p>
@@ -433,7 +432,7 @@
           <a:p>
             <a:fld id="{AD1AA28E-6C04-4118-9F0B-62AFCDC37ADA}" type="datetimeFigureOut">
               <a:rPr lang="pt-BR" smtClean="0"/>
-              <a:t>27/05/2015</a:t>
+              <a:t>02/06/2015</a:t>
             </a:fld>
             <a:endParaRPr lang="pt-BR"/>
           </a:p>
@@ -613,7 +612,7 @@
           <a:p>
             <a:fld id="{AD1AA28E-6C04-4118-9F0B-62AFCDC37ADA}" type="datetimeFigureOut">
               <a:rPr lang="pt-BR" smtClean="0"/>
-              <a:t>27/05/2015</a:t>
+              <a:t>02/06/2015</a:t>
             </a:fld>
             <a:endParaRPr lang="pt-BR"/>
           </a:p>
@@ -783,7 +782,7 @@
           <a:p>
             <a:fld id="{AD1AA28E-6C04-4118-9F0B-62AFCDC37ADA}" type="datetimeFigureOut">
               <a:rPr lang="pt-BR" smtClean="0"/>
-              <a:t>27/05/2015</a:t>
+              <a:t>02/06/2015</a:t>
             </a:fld>
             <a:endParaRPr lang="pt-BR"/>
           </a:p>
@@ -1029,7 +1028,7 @@
           <a:p>
             <a:fld id="{AD1AA28E-6C04-4118-9F0B-62AFCDC37ADA}" type="datetimeFigureOut">
               <a:rPr lang="pt-BR" smtClean="0"/>
-              <a:t>27/05/2015</a:t>
+              <a:t>02/06/2015</a:t>
             </a:fld>
             <a:endParaRPr lang="pt-BR"/>
           </a:p>
@@ -1261,7 +1260,7 @@
           <a:p>
             <a:fld id="{AD1AA28E-6C04-4118-9F0B-62AFCDC37ADA}" type="datetimeFigureOut">
               <a:rPr lang="pt-BR" smtClean="0"/>
-              <a:t>27/05/2015</a:t>
+              <a:t>02/06/2015</a:t>
             </a:fld>
             <a:endParaRPr lang="pt-BR"/>
           </a:p>
@@ -1628,7 +1627,7 @@
           <a:p>
             <a:fld id="{AD1AA28E-6C04-4118-9F0B-62AFCDC37ADA}" type="datetimeFigureOut">
               <a:rPr lang="pt-BR" smtClean="0"/>
-              <a:t>27/05/2015</a:t>
+              <a:t>02/06/2015</a:t>
             </a:fld>
             <a:endParaRPr lang="pt-BR"/>
           </a:p>
@@ -1746,7 +1745,7 @@
           <a:p>
             <a:fld id="{AD1AA28E-6C04-4118-9F0B-62AFCDC37ADA}" type="datetimeFigureOut">
               <a:rPr lang="pt-BR" smtClean="0"/>
-              <a:t>27/05/2015</a:t>
+              <a:t>02/06/2015</a:t>
             </a:fld>
             <a:endParaRPr lang="pt-BR"/>
           </a:p>
@@ -1841,7 +1840,7 @@
           <a:p>
             <a:fld id="{AD1AA28E-6C04-4118-9F0B-62AFCDC37ADA}" type="datetimeFigureOut">
               <a:rPr lang="pt-BR" smtClean="0"/>
-              <a:t>27/05/2015</a:t>
+              <a:t>02/06/2015</a:t>
             </a:fld>
             <a:endParaRPr lang="pt-BR"/>
           </a:p>
@@ -2118,7 +2117,7 @@
           <a:p>
             <a:fld id="{AD1AA28E-6C04-4118-9F0B-62AFCDC37ADA}" type="datetimeFigureOut">
               <a:rPr lang="pt-BR" smtClean="0"/>
-              <a:t>27/05/2015</a:t>
+              <a:t>02/06/2015</a:t>
             </a:fld>
             <a:endParaRPr lang="pt-BR"/>
           </a:p>
@@ -2371,7 +2370,7 @@
           <a:p>
             <a:fld id="{AD1AA28E-6C04-4118-9F0B-62AFCDC37ADA}" type="datetimeFigureOut">
               <a:rPr lang="pt-BR" smtClean="0"/>
-              <a:t>27/05/2015</a:t>
+              <a:t>02/06/2015</a:t>
             </a:fld>
             <a:endParaRPr lang="pt-BR"/>
           </a:p>
@@ -2584,7 +2583,7 @@
           <a:p>
             <a:fld id="{AD1AA28E-6C04-4118-9F0B-62AFCDC37ADA}" type="datetimeFigureOut">
               <a:rPr lang="pt-BR" smtClean="0"/>
-              <a:t>27/05/2015</a:t>
+              <a:t>02/06/2015</a:t>
             </a:fld>
             <a:endParaRPr lang="pt-BR"/>
           </a:p>
@@ -3237,111 +3236,6 @@
 </p:sld>
 </file>
 
-<file path=ppt/slides/slide10.xml><?xml version="1.0" encoding="utf-8"?>
-<p:sld xmlns:a="http://schemas.openxmlformats.org/drawingml/2006/main" xmlns:r="http://schemas.openxmlformats.org/officeDocument/2006/relationships" xmlns:p="http://schemas.openxmlformats.org/presentationml/2006/main">
-  <p:cSld>
-    <p:bg>
-      <p:bgPr>
-        <a:gradFill flip="none" rotWithShape="1">
-          <a:gsLst>
-            <a:gs pos="0">
-              <a:schemeClr val="accent6">
-                <a:lumMod val="67000"/>
-              </a:schemeClr>
-            </a:gs>
-            <a:gs pos="48000">
-              <a:schemeClr val="accent6">
-                <a:lumMod val="97000"/>
-                <a:lumOff val="3000"/>
-              </a:schemeClr>
-            </a:gs>
-            <a:gs pos="100000">
-              <a:schemeClr val="accent6">
-                <a:lumMod val="60000"/>
-                <a:lumOff val="40000"/>
-              </a:schemeClr>
-            </a:gs>
-          </a:gsLst>
-          <a:path path="circle">
-            <a:fillToRect l="100000" t="100000"/>
-          </a:path>
-          <a:tileRect r="-100000" b="-100000"/>
-        </a:gradFill>
-        <a:effectLst/>
-      </p:bgPr>
-    </p:bg>
-    <p:spTree>
-      <p:nvGrpSpPr>
-        <p:cNvPr id="1" name=""/>
-        <p:cNvGrpSpPr/>
-        <p:nvPr/>
-      </p:nvGrpSpPr>
-      <p:grpSpPr>
-        <a:xfrm>
-          <a:off x="0" y="0"/>
-          <a:ext cx="0" cy="0"/>
-          <a:chOff x="0" y="0"/>
-          <a:chExt cx="0" cy="0"/>
-        </a:xfrm>
-      </p:grpSpPr>
-      <p:sp>
-        <p:nvSpPr>
-          <p:cNvPr id="2" name="Title 1"/>
-          <p:cNvSpPr>
-            <a:spLocks noGrp="1"/>
-          </p:cNvSpPr>
-          <p:nvPr>
-            <p:ph type="title"/>
-          </p:nvPr>
-        </p:nvSpPr>
-        <p:spPr/>
-        <p:txBody>
-          <a:bodyPr/>
-          <a:lstStyle/>
-          <a:p>
-            <a:endParaRPr lang="pt-BR"/>
-          </a:p>
-        </p:txBody>
-      </p:sp>
-      <p:sp>
-        <p:nvSpPr>
-          <p:cNvPr id="3" name="Content Placeholder 2"/>
-          <p:cNvSpPr>
-            <a:spLocks noGrp="1"/>
-          </p:cNvSpPr>
-          <p:nvPr>
-            <p:ph idx="1"/>
-          </p:nvPr>
-        </p:nvSpPr>
-        <p:spPr/>
-        <p:txBody>
-          <a:bodyPr/>
-          <a:lstStyle/>
-          <a:p>
-            <a:endParaRPr lang="pt-BR"/>
-          </a:p>
-        </p:txBody>
-      </p:sp>
-    </p:spTree>
-    <p:extLst>
-      <p:ext uri="{BB962C8B-B14F-4D97-AF65-F5344CB8AC3E}">
-        <p14:creationId xmlns:p14="http://schemas.microsoft.com/office/powerpoint/2010/main" val="3414705876"/>
-      </p:ext>
-    </p:extLst>
-  </p:cSld>
-  <p:clrMapOvr>
-    <a:masterClrMapping/>
-  </p:clrMapOvr>
-  <p:timing>
-    <p:tnLst>
-      <p:par>
-        <p:cTn id="1" dur="indefinite" restart="never" nodeType="tmRoot"/>
-      </p:par>
-    </p:tnLst>
-  </p:timing>
-</p:sld>
-</file>
-
 <file path=ppt/slides/slide2.xml><?xml version="1.0" encoding="utf-8"?>
 <p:sld xmlns:a="http://schemas.openxmlformats.org/drawingml/2006/main" xmlns:r="http://schemas.openxmlformats.org/officeDocument/2006/relationships" xmlns:p="http://schemas.openxmlformats.org/presentationml/2006/main">
   <p:cSld>
@@ -3359,204 +3253,204 @@
           <a:chExt cx="0" cy="0"/>
         </a:xfrm>
       </p:grpSpPr>
+      <p:sp>
+        <p:nvSpPr>
+          <p:cNvPr id="4" name="Rectangle 3"/>
+          <p:cNvSpPr/>
+          <p:nvPr/>
+        </p:nvSpPr>
+        <p:spPr>
+          <a:xfrm>
+            <a:off x="389431" y="2348415"/>
+            <a:ext cx="3224463" cy="1430073"/>
+          </a:xfrm>
+          <a:prstGeom prst="rect">
+            <a:avLst/>
+          </a:prstGeom>
+          <a:gradFill flip="none" rotWithShape="1">
+            <a:gsLst>
+              <a:gs pos="0">
+                <a:srgbClr val="008000"/>
+              </a:gs>
+              <a:gs pos="48000">
+                <a:schemeClr val="accent6">
+                  <a:lumMod val="97000"/>
+                  <a:lumOff val="3000"/>
+                </a:schemeClr>
+              </a:gs>
+              <a:gs pos="100000">
+                <a:schemeClr val="accent6">
+                  <a:lumMod val="60000"/>
+                  <a:lumOff val="40000"/>
+                </a:schemeClr>
+              </a:gs>
+            </a:gsLst>
+            <a:lin ang="16200000" scaled="1"/>
+            <a:tileRect/>
+          </a:gradFill>
+          <a:ln>
+            <a:noFill/>
+          </a:ln>
+        </p:spPr>
+        <p:style>
+          <a:lnRef idx="2">
+            <a:schemeClr val="accent2"/>
+          </a:lnRef>
+          <a:fillRef idx="1003">
+            <a:schemeClr val="dk1"/>
+          </a:fillRef>
+          <a:effectRef idx="0">
+            <a:schemeClr val="accent2"/>
+          </a:effectRef>
+          <a:fontRef idx="minor">
+            <a:schemeClr val="dk1"/>
+          </a:fontRef>
+        </p:style>
+        <p:txBody>
+          <a:bodyPr rtlCol="0" anchor="ctr"/>
+          <a:lstStyle/>
+          <a:p>
+            <a:pPr algn="ctr"/>
+            <a:endParaRPr lang="pt-BR" dirty="0"/>
+          </a:p>
+        </p:txBody>
+      </p:sp>
+      <p:sp>
+        <p:nvSpPr>
+          <p:cNvPr id="24" name="Snip Single Corner Rectangle 23"/>
+          <p:cNvSpPr/>
+          <p:nvPr/>
+        </p:nvSpPr>
+        <p:spPr>
+          <a:xfrm rot="10800000">
+            <a:off x="3005506" y="2383970"/>
+            <a:ext cx="608386" cy="167313"/>
+          </a:xfrm>
+          <a:prstGeom prst="snip1Rect">
+            <a:avLst>
+              <a:gd name="adj" fmla="val 50000"/>
+            </a:avLst>
+          </a:prstGeom>
+        </p:spPr>
+        <p:style>
+          <a:lnRef idx="0">
+            <a:schemeClr val="dk1"/>
+          </a:lnRef>
+          <a:fillRef idx="3">
+            <a:schemeClr val="dk1"/>
+          </a:fillRef>
+          <a:effectRef idx="3">
+            <a:schemeClr val="dk1"/>
+          </a:effectRef>
+          <a:fontRef idx="minor">
+            <a:schemeClr val="lt1"/>
+          </a:fontRef>
+        </p:style>
+        <p:txBody>
+          <a:bodyPr rtlCol="0" anchor="ctr"/>
+          <a:lstStyle/>
+          <a:p>
+            <a:pPr algn="ctr"/>
+            <a:endParaRPr lang="pt-BR"/>
+          </a:p>
+        </p:txBody>
+      </p:sp>
+      <p:sp>
+        <p:nvSpPr>
+          <p:cNvPr id="21" name="Rectangle 20"/>
+          <p:cNvSpPr/>
+          <p:nvPr/>
+        </p:nvSpPr>
+        <p:spPr>
+          <a:xfrm>
+            <a:off x="397053" y="3667625"/>
+            <a:ext cx="3216841" cy="111210"/>
+          </a:xfrm>
+          <a:prstGeom prst="rect">
+            <a:avLst/>
+          </a:prstGeom>
+          <a:ln>
+            <a:noFill/>
+          </a:ln>
+        </p:spPr>
+        <p:style>
+          <a:lnRef idx="0">
+            <a:schemeClr val="dk1"/>
+          </a:lnRef>
+          <a:fillRef idx="3">
+            <a:schemeClr val="dk1"/>
+          </a:fillRef>
+          <a:effectRef idx="3">
+            <a:schemeClr val="dk1"/>
+          </a:effectRef>
+          <a:fontRef idx="minor">
+            <a:schemeClr val="lt1"/>
+          </a:fontRef>
+        </p:style>
+        <p:txBody>
+          <a:bodyPr rtlCol="0" anchor="ctr"/>
+          <a:lstStyle/>
+          <a:p>
+            <a:pPr algn="ctr"/>
+            <a:endParaRPr lang="pt-BR"/>
+          </a:p>
+        </p:txBody>
+      </p:sp>
+      <p:sp>
+        <p:nvSpPr>
+          <p:cNvPr id="22" name="Rectangle 21"/>
+          <p:cNvSpPr/>
+          <p:nvPr/>
+        </p:nvSpPr>
+        <p:spPr>
+          <a:xfrm>
+            <a:off x="400674" y="2362853"/>
+            <a:ext cx="3213219" cy="104775"/>
+          </a:xfrm>
+          <a:prstGeom prst="rect">
+            <a:avLst/>
+          </a:prstGeom>
+          <a:ln>
+            <a:noFill/>
+          </a:ln>
+        </p:spPr>
+        <p:style>
+          <a:lnRef idx="0">
+            <a:schemeClr val="dk1"/>
+          </a:lnRef>
+          <a:fillRef idx="3">
+            <a:schemeClr val="dk1"/>
+          </a:fillRef>
+          <a:effectRef idx="3">
+            <a:schemeClr val="dk1"/>
+          </a:effectRef>
+          <a:fontRef idx="minor">
+            <a:schemeClr val="lt1"/>
+          </a:fontRef>
+        </p:style>
+        <p:txBody>
+          <a:bodyPr rtlCol="0" anchor="ctr"/>
+          <a:lstStyle/>
+          <a:p>
+            <a:pPr algn="ctr"/>
+            <a:endParaRPr lang="pt-BR"/>
+          </a:p>
+        </p:txBody>
+      </p:sp>
       <p:grpSp>
         <p:nvGrpSpPr>
-          <p:cNvPr id="7" name="Group 6"/>
+          <p:cNvPr id="5" name="Group 4"/>
           <p:cNvGrpSpPr/>
           <p:nvPr/>
         </p:nvGrpSpPr>
         <p:grpSpPr>
           <a:xfrm>
-            <a:off x="389431" y="2348415"/>
-            <a:ext cx="3224463" cy="1430420"/>
-            <a:chOff x="948699" y="3936743"/>
-            <a:chExt cx="3224463" cy="1430420"/>
+            <a:off x="3194411" y="2375943"/>
+            <a:ext cx="353674" cy="121881"/>
+            <a:chOff x="3194411" y="2375943"/>
+            <a:chExt cx="353674" cy="121881"/>
           </a:xfrm>
         </p:grpSpPr>
-        <p:sp>
-          <p:nvSpPr>
-            <p:cNvPr id="4" name="Rectangle 3"/>
-            <p:cNvSpPr/>
-            <p:nvPr/>
-          </p:nvSpPr>
-          <p:spPr>
-            <a:xfrm>
-              <a:off x="948699" y="3936743"/>
-              <a:ext cx="3224463" cy="1430073"/>
-            </a:xfrm>
-            <a:prstGeom prst="rect">
-              <a:avLst/>
-            </a:prstGeom>
-            <a:gradFill flip="none" rotWithShape="1">
-              <a:gsLst>
-                <a:gs pos="0">
-                  <a:srgbClr val="008000"/>
-                </a:gs>
-                <a:gs pos="48000">
-                  <a:schemeClr val="accent6">
-                    <a:lumMod val="97000"/>
-                    <a:lumOff val="3000"/>
-                  </a:schemeClr>
-                </a:gs>
-                <a:gs pos="100000">
-                  <a:schemeClr val="accent6">
-                    <a:lumMod val="60000"/>
-                    <a:lumOff val="40000"/>
-                  </a:schemeClr>
-                </a:gs>
-              </a:gsLst>
-              <a:lin ang="16200000" scaled="1"/>
-              <a:tileRect/>
-            </a:gradFill>
-            <a:ln>
-              <a:noFill/>
-            </a:ln>
-          </p:spPr>
-          <p:style>
-            <a:lnRef idx="2">
-              <a:schemeClr val="accent2"/>
-            </a:lnRef>
-            <a:fillRef idx="1003">
-              <a:schemeClr val="dk1"/>
-            </a:fillRef>
-            <a:effectRef idx="0">
-              <a:schemeClr val="accent2"/>
-            </a:effectRef>
-            <a:fontRef idx="minor">
-              <a:schemeClr val="dk1"/>
-            </a:fontRef>
-          </p:style>
-          <p:txBody>
-            <a:bodyPr rtlCol="0" anchor="ctr"/>
-            <a:lstStyle/>
-            <a:p>
-              <a:pPr algn="ctr"/>
-              <a:endParaRPr lang="pt-BR" dirty="0"/>
-            </a:p>
-          </p:txBody>
-        </p:sp>
-        <p:sp>
-          <p:nvSpPr>
-            <p:cNvPr id="24" name="Snip Single Corner Rectangle 23"/>
-            <p:cNvSpPr/>
-            <p:nvPr/>
-          </p:nvSpPr>
-          <p:spPr>
-            <a:xfrm rot="10800000">
-              <a:off x="3564774" y="3972298"/>
-              <a:ext cx="608386" cy="167313"/>
-            </a:xfrm>
-            <a:prstGeom prst="snip1Rect">
-              <a:avLst>
-                <a:gd name="adj" fmla="val 50000"/>
-              </a:avLst>
-            </a:prstGeom>
-          </p:spPr>
-          <p:style>
-            <a:lnRef idx="0">
-              <a:schemeClr val="dk1"/>
-            </a:lnRef>
-            <a:fillRef idx="3">
-              <a:schemeClr val="dk1"/>
-            </a:fillRef>
-            <a:effectRef idx="3">
-              <a:schemeClr val="dk1"/>
-            </a:effectRef>
-            <a:fontRef idx="minor">
-              <a:schemeClr val="lt1"/>
-            </a:fontRef>
-          </p:style>
-          <p:txBody>
-            <a:bodyPr rtlCol="0" anchor="ctr"/>
-            <a:lstStyle/>
-            <a:p>
-              <a:pPr algn="ctr"/>
-              <a:endParaRPr lang="pt-BR"/>
-            </a:p>
-          </p:txBody>
-        </p:sp>
-        <p:sp>
-          <p:nvSpPr>
-            <p:cNvPr id="21" name="Rectangle 20"/>
-            <p:cNvSpPr/>
-            <p:nvPr/>
-          </p:nvSpPr>
-          <p:spPr>
-            <a:xfrm>
-              <a:off x="956321" y="5255953"/>
-              <a:ext cx="3216841" cy="111210"/>
-            </a:xfrm>
-            <a:prstGeom prst="rect">
-              <a:avLst/>
-            </a:prstGeom>
-            <a:ln>
-              <a:noFill/>
-            </a:ln>
-          </p:spPr>
-          <p:style>
-            <a:lnRef idx="0">
-              <a:schemeClr val="dk1"/>
-            </a:lnRef>
-            <a:fillRef idx="3">
-              <a:schemeClr val="dk1"/>
-            </a:fillRef>
-            <a:effectRef idx="3">
-              <a:schemeClr val="dk1"/>
-            </a:effectRef>
-            <a:fontRef idx="minor">
-              <a:schemeClr val="lt1"/>
-            </a:fontRef>
-          </p:style>
-          <p:txBody>
-            <a:bodyPr rtlCol="0" anchor="ctr"/>
-            <a:lstStyle/>
-            <a:p>
-              <a:pPr algn="ctr"/>
-              <a:endParaRPr lang="pt-BR"/>
-            </a:p>
-          </p:txBody>
-        </p:sp>
-        <p:sp>
-          <p:nvSpPr>
-            <p:cNvPr id="22" name="Rectangle 21"/>
-            <p:cNvSpPr/>
-            <p:nvPr/>
-          </p:nvSpPr>
-          <p:spPr>
-            <a:xfrm>
-              <a:off x="959942" y="3951181"/>
-              <a:ext cx="3213219" cy="104775"/>
-            </a:xfrm>
-            <a:prstGeom prst="rect">
-              <a:avLst/>
-            </a:prstGeom>
-            <a:ln>
-              <a:noFill/>
-            </a:ln>
-          </p:spPr>
-          <p:style>
-            <a:lnRef idx="0">
-              <a:schemeClr val="dk1"/>
-            </a:lnRef>
-            <a:fillRef idx="3">
-              <a:schemeClr val="dk1"/>
-            </a:fillRef>
-            <a:effectRef idx="3">
-              <a:schemeClr val="dk1"/>
-            </a:effectRef>
-            <a:fontRef idx="minor">
-              <a:schemeClr val="lt1"/>
-            </a:fontRef>
-          </p:style>
-          <p:txBody>
-            <a:bodyPr rtlCol="0" anchor="ctr"/>
-            <a:lstStyle/>
-            <a:p>
-              <a:pPr algn="ctr"/>
-              <a:endParaRPr lang="pt-BR"/>
-            </a:p>
-          </p:txBody>
-        </p:sp>
         <p:sp>
           <p:nvSpPr>
             <p:cNvPr id="8" name="Oval 7"/>
@@ -3565,7 +3459,7 @@
           </p:nvSpPr>
           <p:spPr>
             <a:xfrm>
-              <a:off x="3753679" y="3964271"/>
+              <a:off x="3194411" y="2375943"/>
               <a:ext cx="140672" cy="121881"/>
             </a:xfrm>
             <a:prstGeom prst="ellipse">
@@ -3603,7 +3497,7 @@
           </p:nvSpPr>
           <p:spPr>
             <a:xfrm>
-              <a:off x="3966681" y="3964271"/>
+              <a:off x="3407413" y="2375943"/>
               <a:ext cx="140672" cy="121881"/>
             </a:xfrm>
             <a:prstGeom prst="ellipse">
@@ -3641,7 +3535,7 @@
           </p:nvSpPr>
           <p:spPr>
             <a:xfrm>
-              <a:off x="3792588" y="4006252"/>
+              <a:off x="3233320" y="2417924"/>
               <a:ext cx="65846" cy="41981"/>
             </a:xfrm>
             <a:prstGeom prst="mathMinus">
@@ -3679,7 +3573,7 @@
           </p:nvSpPr>
           <p:spPr>
             <a:xfrm>
-              <a:off x="3986634" y="3971042"/>
+              <a:off x="3427366" y="2382714"/>
               <a:ext cx="100765" cy="111047"/>
             </a:xfrm>
             <a:prstGeom prst="mathMultiply">
@@ -3709,247 +3603,247 @@
             </a:p>
           </p:txBody>
         </p:sp>
-        <p:sp>
-          <p:nvSpPr>
-            <p:cNvPr id="27" name="Flowchart: Stored Data 26"/>
-            <p:cNvSpPr/>
-            <p:nvPr/>
-          </p:nvSpPr>
-          <p:spPr>
-            <a:xfrm flipH="1">
-              <a:off x="2997944" y="4343280"/>
-              <a:ext cx="837381" cy="217560"/>
-            </a:xfrm>
-            <a:prstGeom prst="flowChartOnlineStorage">
-              <a:avLst/>
-            </a:prstGeom>
-          </p:spPr>
-          <p:style>
-            <a:lnRef idx="1">
-              <a:schemeClr val="accent6"/>
-            </a:lnRef>
-            <a:fillRef idx="3">
-              <a:schemeClr val="accent6"/>
-            </a:fillRef>
-            <a:effectRef idx="2">
-              <a:schemeClr val="accent6"/>
-            </a:effectRef>
-            <a:fontRef idx="minor">
-              <a:schemeClr val="lt1"/>
-            </a:fontRef>
-          </p:style>
-          <p:txBody>
-            <a:bodyPr rtlCol="0" anchor="ctr"/>
-            <a:lstStyle/>
-            <a:p>
-              <a:pPr algn="ctr"/>
-              <a:endParaRPr lang="pt-BR"/>
-            </a:p>
-          </p:txBody>
-        </p:sp>
-        <p:sp>
-          <p:nvSpPr>
-            <p:cNvPr id="25" name="Rounded Rectangle 24"/>
-            <p:cNvSpPr/>
-            <p:nvPr/>
-          </p:nvSpPr>
-          <p:spPr>
-            <a:xfrm>
-              <a:off x="1789050" y="4343628"/>
-              <a:ext cx="1370518" cy="221577"/>
-            </a:xfrm>
-            <a:prstGeom prst="roundRect">
-              <a:avLst/>
-            </a:prstGeom>
-          </p:spPr>
-          <p:style>
-            <a:lnRef idx="2">
-              <a:schemeClr val="accent6"/>
-            </a:lnRef>
-            <a:fillRef idx="1">
-              <a:schemeClr val="lt1"/>
-            </a:fillRef>
-            <a:effectRef idx="0">
-              <a:schemeClr val="accent6"/>
-            </a:effectRef>
-            <a:fontRef idx="minor">
-              <a:schemeClr val="dk1"/>
-            </a:fontRef>
-          </p:style>
-          <p:txBody>
-            <a:bodyPr rtlCol="0" anchor="ctr"/>
-            <a:lstStyle/>
-            <a:p>
-              <a:pPr algn="ctr"/>
-              <a:endParaRPr lang="pt-BR"/>
-            </a:p>
-          </p:txBody>
-        </p:sp>
-        <p:sp>
-          <p:nvSpPr>
-            <p:cNvPr id="32" name="TextBox 31"/>
-            <p:cNvSpPr txBox="1"/>
-            <p:nvPr/>
-          </p:nvSpPr>
-          <p:spPr>
-            <a:xfrm>
-              <a:off x="3054631" y="4343280"/>
-              <a:ext cx="744779" cy="230832"/>
-            </a:xfrm>
-            <a:prstGeom prst="rect">
-              <a:avLst/>
-            </a:prstGeom>
-            <a:noFill/>
-          </p:spPr>
-          <p:txBody>
-            <a:bodyPr wrap="square" rtlCol="0">
-              <a:spAutoFit/>
-            </a:bodyPr>
-            <a:lstStyle/>
-            <a:p>
-              <a:pPr algn="ctr"/>
-              <a:r>
-                <a:rPr lang="pt-BR" sz="900" dirty="0" smtClean="0">
-                  <a:solidFill>
-                    <a:schemeClr val="bg1"/>
-                  </a:solidFill>
-                  <a:latin typeface="Baskerville Old Face" panose="02020602080505020303" pitchFamily="18" charset="0"/>
-                </a:rPr>
-                <a:t>Gravar</a:t>
-              </a:r>
-              <a:endParaRPr lang="pt-BR" sz="1600" dirty="0">
+      </p:grpSp>
+      <p:sp>
+        <p:nvSpPr>
+          <p:cNvPr id="27" name="Flowchart: Stored Data 26"/>
+          <p:cNvSpPr/>
+          <p:nvPr/>
+        </p:nvSpPr>
+        <p:spPr>
+          <a:xfrm flipH="1">
+            <a:off x="2438676" y="2754952"/>
+            <a:ext cx="837381" cy="217560"/>
+          </a:xfrm>
+          <a:prstGeom prst="flowChartOnlineStorage">
+            <a:avLst/>
+          </a:prstGeom>
+        </p:spPr>
+        <p:style>
+          <a:lnRef idx="1">
+            <a:schemeClr val="accent6"/>
+          </a:lnRef>
+          <a:fillRef idx="3">
+            <a:schemeClr val="accent6"/>
+          </a:fillRef>
+          <a:effectRef idx="2">
+            <a:schemeClr val="accent6"/>
+          </a:effectRef>
+          <a:fontRef idx="minor">
+            <a:schemeClr val="lt1"/>
+          </a:fontRef>
+        </p:style>
+        <p:txBody>
+          <a:bodyPr rtlCol="0" anchor="ctr"/>
+          <a:lstStyle/>
+          <a:p>
+            <a:pPr algn="ctr"/>
+            <a:endParaRPr lang="pt-BR"/>
+          </a:p>
+        </p:txBody>
+      </p:sp>
+      <p:sp>
+        <p:nvSpPr>
+          <p:cNvPr id="25" name="Rounded Rectangle 24"/>
+          <p:cNvSpPr/>
+          <p:nvPr/>
+        </p:nvSpPr>
+        <p:spPr>
+          <a:xfrm>
+            <a:off x="1229782" y="2755300"/>
+            <a:ext cx="1370518" cy="221577"/>
+          </a:xfrm>
+          <a:prstGeom prst="roundRect">
+            <a:avLst/>
+          </a:prstGeom>
+        </p:spPr>
+        <p:style>
+          <a:lnRef idx="2">
+            <a:schemeClr val="accent6"/>
+          </a:lnRef>
+          <a:fillRef idx="1">
+            <a:schemeClr val="lt1"/>
+          </a:fillRef>
+          <a:effectRef idx="0">
+            <a:schemeClr val="accent6"/>
+          </a:effectRef>
+          <a:fontRef idx="minor">
+            <a:schemeClr val="dk1"/>
+          </a:fontRef>
+        </p:style>
+        <p:txBody>
+          <a:bodyPr rtlCol="0" anchor="ctr"/>
+          <a:lstStyle/>
+          <a:p>
+            <a:pPr algn="ctr"/>
+            <a:endParaRPr lang="pt-BR"/>
+          </a:p>
+        </p:txBody>
+      </p:sp>
+      <p:sp>
+        <p:nvSpPr>
+          <p:cNvPr id="32" name="TextBox 31"/>
+          <p:cNvSpPr txBox="1"/>
+          <p:nvPr/>
+        </p:nvSpPr>
+        <p:spPr>
+          <a:xfrm>
+            <a:off x="2495363" y="2754952"/>
+            <a:ext cx="744779" cy="230832"/>
+          </a:xfrm>
+          <a:prstGeom prst="rect">
+            <a:avLst/>
+          </a:prstGeom>
+          <a:noFill/>
+        </p:spPr>
+        <p:txBody>
+          <a:bodyPr wrap="square" rtlCol="0">
+            <a:spAutoFit/>
+          </a:bodyPr>
+          <a:lstStyle/>
+          <a:p>
+            <a:pPr algn="ctr"/>
+            <a:r>
+              <a:rPr lang="pt-BR" sz="900" dirty="0" smtClean="0">
                 <a:solidFill>
                   <a:schemeClr val="bg1"/>
                 </a:solidFill>
                 <a:latin typeface="Baskerville Old Face" panose="02020602080505020303" pitchFamily="18" charset="0"/>
-              </a:endParaRPr>
-            </a:p>
-          </p:txBody>
-        </p:sp>
-        <p:sp>
-          <p:nvSpPr>
-            <p:cNvPr id="34" name="TextBox 33"/>
-            <p:cNvSpPr txBox="1"/>
-            <p:nvPr/>
-          </p:nvSpPr>
-          <p:spPr>
-            <a:xfrm>
-              <a:off x="1629276" y="4131505"/>
-              <a:ext cx="744778" cy="230832"/>
-            </a:xfrm>
-            <a:prstGeom prst="rect">
-              <a:avLst/>
-            </a:prstGeom>
-            <a:noFill/>
-          </p:spPr>
-          <p:txBody>
-            <a:bodyPr wrap="square" rtlCol="0">
-              <a:spAutoFit/>
-            </a:bodyPr>
-            <a:lstStyle/>
-            <a:p>
-              <a:pPr algn="ctr"/>
-              <a:r>
-                <a:rPr lang="pt-BR" sz="900" dirty="0" smtClean="0">
-                  <a:solidFill>
-                    <a:schemeClr val="bg1"/>
-                  </a:solidFill>
-                  <a:latin typeface="Baskerville Old Face" panose="02020602080505020303" pitchFamily="18" charset="0"/>
-                </a:rPr>
-                <a:t>Nome</a:t>
-              </a:r>
-              <a:endParaRPr lang="pt-BR" sz="1600" dirty="0">
+              </a:rPr>
+              <a:t>Gravar</a:t>
+            </a:r>
+            <a:endParaRPr lang="pt-BR" sz="1600" dirty="0">
+              <a:solidFill>
+                <a:schemeClr val="bg1"/>
+              </a:solidFill>
+              <a:latin typeface="Baskerville Old Face" panose="02020602080505020303" pitchFamily="18" charset="0"/>
+            </a:endParaRPr>
+          </a:p>
+        </p:txBody>
+      </p:sp>
+      <p:sp>
+        <p:nvSpPr>
+          <p:cNvPr id="34" name="TextBox 33"/>
+          <p:cNvSpPr txBox="1"/>
+          <p:nvPr/>
+        </p:nvSpPr>
+        <p:spPr>
+          <a:xfrm>
+            <a:off x="1070008" y="2543177"/>
+            <a:ext cx="744778" cy="230832"/>
+          </a:xfrm>
+          <a:prstGeom prst="rect">
+            <a:avLst/>
+          </a:prstGeom>
+          <a:noFill/>
+        </p:spPr>
+        <p:txBody>
+          <a:bodyPr wrap="square" rtlCol="0">
+            <a:spAutoFit/>
+          </a:bodyPr>
+          <a:lstStyle/>
+          <a:p>
+            <a:pPr algn="ctr"/>
+            <a:r>
+              <a:rPr lang="pt-BR" sz="900" dirty="0" smtClean="0">
                 <a:solidFill>
                   <a:schemeClr val="bg1"/>
                 </a:solidFill>
                 <a:latin typeface="Baskerville Old Face" panose="02020602080505020303" pitchFamily="18" charset="0"/>
-              </a:endParaRPr>
-            </a:p>
-          </p:txBody>
-        </p:sp>
-        <p:sp>
-          <p:nvSpPr>
-            <p:cNvPr id="2" name="Round Same Side Corner Rectangle 1"/>
-            <p:cNvSpPr/>
-            <p:nvPr/>
-          </p:nvSpPr>
-          <p:spPr>
-            <a:xfrm flipV="1">
-              <a:off x="1789050" y="4562551"/>
-              <a:ext cx="1370518" cy="481626"/>
-            </a:xfrm>
-            <a:prstGeom prst="round2SameRect">
-              <a:avLst>
-                <a:gd name="adj1" fmla="val 50000"/>
-                <a:gd name="adj2" fmla="val 0"/>
-              </a:avLst>
-            </a:prstGeom>
-          </p:spPr>
-          <p:style>
-            <a:lnRef idx="1">
-              <a:schemeClr val="accent6"/>
-            </a:lnRef>
-            <a:fillRef idx="3">
-              <a:schemeClr val="accent6"/>
-            </a:fillRef>
-            <a:effectRef idx="2">
-              <a:schemeClr val="accent6"/>
-            </a:effectRef>
-            <a:fontRef idx="minor">
-              <a:schemeClr val="lt1"/>
-            </a:fontRef>
-          </p:style>
-          <p:txBody>
-            <a:bodyPr rtlCol="0" anchor="ctr"/>
-            <a:lstStyle/>
-            <a:p>
-              <a:pPr algn="ctr"/>
-              <a:endParaRPr lang="pt-BR"/>
-            </a:p>
-          </p:txBody>
-        </p:sp>
-        <p:sp>
-          <p:nvSpPr>
-            <p:cNvPr id="47" name="TextBox 46"/>
-            <p:cNvSpPr txBox="1"/>
-            <p:nvPr/>
-          </p:nvSpPr>
-          <p:spPr>
-            <a:xfrm>
-              <a:off x="1629276" y="4571959"/>
-              <a:ext cx="744778" cy="230832"/>
-            </a:xfrm>
-            <a:prstGeom prst="rect">
-              <a:avLst/>
-            </a:prstGeom>
-            <a:noFill/>
-          </p:spPr>
-          <p:txBody>
-            <a:bodyPr wrap="square" rtlCol="0">
-              <a:spAutoFit/>
-            </a:bodyPr>
-            <a:lstStyle/>
-            <a:p>
-              <a:pPr algn="ctr"/>
-              <a:r>
-                <a:rPr lang="pt-BR" sz="900" dirty="0" smtClean="0">
-                  <a:solidFill>
-                    <a:schemeClr val="bg1"/>
-                  </a:solidFill>
-                  <a:latin typeface="Baskerville Old Face" panose="02020602080505020303" pitchFamily="18" charset="0"/>
-                </a:rPr>
-                <a:t>Cidade</a:t>
-              </a:r>
-              <a:endParaRPr lang="pt-BR" sz="1600" dirty="0">
+              </a:rPr>
+              <a:t>Nome</a:t>
+            </a:r>
+            <a:endParaRPr lang="pt-BR" sz="1600" dirty="0">
+              <a:solidFill>
+                <a:schemeClr val="bg1"/>
+              </a:solidFill>
+              <a:latin typeface="Baskerville Old Face" panose="02020602080505020303" pitchFamily="18" charset="0"/>
+            </a:endParaRPr>
+          </a:p>
+        </p:txBody>
+      </p:sp>
+      <p:sp>
+        <p:nvSpPr>
+          <p:cNvPr id="2" name="Round Same Side Corner Rectangle 1"/>
+          <p:cNvSpPr/>
+          <p:nvPr/>
+        </p:nvSpPr>
+        <p:spPr>
+          <a:xfrm flipV="1">
+            <a:off x="1229782" y="2974223"/>
+            <a:ext cx="1370518" cy="481626"/>
+          </a:xfrm>
+          <a:prstGeom prst="round2SameRect">
+            <a:avLst>
+              <a:gd name="adj1" fmla="val 50000"/>
+              <a:gd name="adj2" fmla="val 0"/>
+            </a:avLst>
+          </a:prstGeom>
+        </p:spPr>
+        <p:style>
+          <a:lnRef idx="1">
+            <a:schemeClr val="accent6"/>
+          </a:lnRef>
+          <a:fillRef idx="3">
+            <a:schemeClr val="accent6"/>
+          </a:fillRef>
+          <a:effectRef idx="2">
+            <a:schemeClr val="accent6"/>
+          </a:effectRef>
+          <a:fontRef idx="minor">
+            <a:schemeClr val="lt1"/>
+          </a:fontRef>
+        </p:style>
+        <p:txBody>
+          <a:bodyPr rtlCol="0" anchor="ctr"/>
+          <a:lstStyle/>
+          <a:p>
+            <a:pPr algn="ctr"/>
+            <a:endParaRPr lang="pt-BR"/>
+          </a:p>
+        </p:txBody>
+      </p:sp>
+      <p:sp>
+        <p:nvSpPr>
+          <p:cNvPr id="47" name="TextBox 46"/>
+          <p:cNvSpPr txBox="1"/>
+          <p:nvPr/>
+        </p:nvSpPr>
+        <p:spPr>
+          <a:xfrm>
+            <a:off x="1070008" y="2983631"/>
+            <a:ext cx="744778" cy="230832"/>
+          </a:xfrm>
+          <a:prstGeom prst="rect">
+            <a:avLst/>
+          </a:prstGeom>
+          <a:noFill/>
+        </p:spPr>
+        <p:txBody>
+          <a:bodyPr wrap="square" rtlCol="0">
+            <a:spAutoFit/>
+          </a:bodyPr>
+          <a:lstStyle/>
+          <a:p>
+            <a:pPr algn="ctr"/>
+            <a:r>
+              <a:rPr lang="pt-BR" sz="900" dirty="0" smtClean="0">
                 <a:solidFill>
                   <a:schemeClr val="bg1"/>
                 </a:solidFill>
                 <a:latin typeface="Baskerville Old Face" panose="02020602080505020303" pitchFamily="18" charset="0"/>
-              </a:endParaRPr>
-            </a:p>
-          </p:txBody>
-        </p:sp>
-      </p:grpSp>
+              </a:rPr>
+              <a:t>Cidade</a:t>
+            </a:r>
+            <a:endParaRPr lang="pt-BR" sz="1600" dirty="0">
+              <a:solidFill>
+                <a:schemeClr val="bg1"/>
+              </a:solidFill>
+              <a:latin typeface="Baskerville Old Face" panose="02020602080505020303" pitchFamily="18" charset="0"/>
+            </a:endParaRPr>
+          </a:p>
+        </p:txBody>
+      </p:sp>
       <p:grpSp>
         <p:nvGrpSpPr>
           <p:cNvPr id="6" name="Group 5"/>
@@ -8582,1307 +8476,6 @@
   <p:cSld>
     <p:bg>
       <p:bgPr>
-        <a:gradFill>
-          <a:gsLst>
-            <a:gs pos="0">
-              <a:schemeClr val="bg1"/>
-            </a:gs>
-            <a:gs pos="74000">
-              <a:schemeClr val="tx1">
-                <a:lumMod val="95000"/>
-                <a:lumOff val="5000"/>
-              </a:schemeClr>
-            </a:gs>
-            <a:gs pos="83000">
-              <a:srgbClr val="38AD05"/>
-            </a:gs>
-            <a:gs pos="100000">
-              <a:schemeClr val="tx1">
-                <a:lumMod val="95000"/>
-                <a:lumOff val="5000"/>
-              </a:schemeClr>
-            </a:gs>
-          </a:gsLst>
-          <a:lin ang="5400000" scaled="1"/>
-        </a:gradFill>
-        <a:effectLst/>
-      </p:bgPr>
-    </p:bg>
-    <p:spTree>
-      <p:nvGrpSpPr>
-        <p:cNvPr id="1" name=""/>
-        <p:cNvGrpSpPr/>
-        <p:nvPr/>
-      </p:nvGrpSpPr>
-      <p:grpSpPr>
-        <a:xfrm>
-          <a:off x="0" y="0"/>
-          <a:ext cx="0" cy="0"/>
-          <a:chOff x="0" y="0"/>
-          <a:chExt cx="0" cy="0"/>
-        </a:xfrm>
-      </p:grpSpPr>
-      <p:grpSp>
-        <p:nvGrpSpPr>
-          <p:cNvPr id="3" name="Group 2"/>
-          <p:cNvGrpSpPr/>
-          <p:nvPr/>
-        </p:nvGrpSpPr>
-        <p:grpSpPr>
-          <a:xfrm>
-            <a:off x="399143" y="1001087"/>
-            <a:ext cx="6872513" cy="1785655"/>
-            <a:chOff x="972457" y="2480561"/>
-            <a:chExt cx="7474857" cy="1727200"/>
-          </a:xfrm>
-          <a:scene3d>
-            <a:camera prst="perspectiveRight"/>
-            <a:lightRig rig="threePt" dir="t"/>
-          </a:scene3d>
-        </p:grpSpPr>
-        <p:sp>
-          <p:nvSpPr>
-            <p:cNvPr id="2" name="Rectangle 1"/>
-            <p:cNvSpPr/>
-            <p:nvPr/>
-          </p:nvSpPr>
-          <p:spPr>
-            <a:xfrm>
-              <a:off x="972457" y="2480561"/>
-              <a:ext cx="7474857" cy="1727200"/>
-            </a:xfrm>
-            <a:prstGeom prst="rect">
-              <a:avLst/>
-            </a:prstGeom>
-          </p:spPr>
-          <p:style>
-            <a:lnRef idx="2">
-              <a:schemeClr val="accent6"/>
-            </a:lnRef>
-            <a:fillRef idx="1">
-              <a:schemeClr val="lt1"/>
-            </a:fillRef>
-            <a:effectRef idx="0">
-              <a:schemeClr val="accent6"/>
-            </a:effectRef>
-            <a:fontRef idx="minor">
-              <a:schemeClr val="dk1"/>
-            </a:fontRef>
-          </p:style>
-          <p:txBody>
-            <a:bodyPr rtlCol="0" anchor="ctr"/>
-            <a:lstStyle/>
-            <a:p>
-              <a:pPr algn="ctr"/>
-              <a:endParaRPr lang="pt-BR"/>
-            </a:p>
-          </p:txBody>
-        </p:sp>
-        <p:pic>
-          <p:nvPicPr>
-            <p:cNvPr id="4" name="Picture 3"/>
-            <p:cNvPicPr>
-              <a:picLocks noChangeAspect="1"/>
-            </p:cNvPicPr>
-            <p:nvPr/>
-          </p:nvPicPr>
-          <p:blipFill rotWithShape="1">
-            <a:blip r:embed="rId2">
-              <a:clrChange>
-                <a:clrFrom>
-                  <a:srgbClr val="FCFCFC"/>
-                </a:clrFrom>
-                <a:clrTo>
-                  <a:srgbClr val="FCFCFC">
-                    <a:alpha val="0"/>
-                  </a:srgbClr>
-                </a:clrTo>
-              </a:clrChange>
-              <a:extLst>
-                <a:ext uri="{28A0092B-C50C-407E-A947-70E740481C1C}">
-                  <a14:useLocalDpi xmlns:a14="http://schemas.microsoft.com/office/drawing/2010/main" val="0"/>
-                </a:ext>
-              </a:extLst>
-            </a:blip>
-            <a:srcRect t="3695" r="626" b="2564"/>
-            <a:stretch/>
-          </p:blipFill>
-          <p:spPr>
-            <a:xfrm>
-              <a:off x="1534278" y="2801607"/>
-              <a:ext cx="6351213" cy="1116106"/>
-            </a:xfrm>
-            <a:prstGeom prst="rect">
-              <a:avLst/>
-            </a:prstGeom>
-          </p:spPr>
-        </p:pic>
-      </p:grpSp>
-      <p:sp>
-        <p:nvSpPr>
-          <p:cNvPr id="5" name="Rectangle 4"/>
-          <p:cNvSpPr/>
-          <p:nvPr/>
-        </p:nvSpPr>
-        <p:spPr>
-          <a:xfrm>
-            <a:off x="0" y="0"/>
-            <a:ext cx="12192000" cy="215153"/>
-          </a:xfrm>
-          <a:prstGeom prst="rect">
-            <a:avLst/>
-          </a:prstGeom>
-          <a:solidFill>
-            <a:schemeClr val="accent6">
-              <a:lumMod val="50000"/>
-            </a:schemeClr>
-          </a:solidFill>
-        </p:spPr>
-        <p:style>
-          <a:lnRef idx="2">
-            <a:schemeClr val="accent1">
-              <a:shade val="50000"/>
-            </a:schemeClr>
-          </a:lnRef>
-          <a:fillRef idx="1">
-            <a:schemeClr val="accent1"/>
-          </a:fillRef>
-          <a:effectRef idx="0">
-            <a:schemeClr val="accent1"/>
-          </a:effectRef>
-          <a:fontRef idx="minor">
-            <a:schemeClr val="lt1"/>
-          </a:fontRef>
-        </p:style>
-        <p:txBody>
-          <a:bodyPr rtlCol="0" anchor="ctr"/>
-          <a:lstStyle/>
-          <a:p>
-            <a:pPr algn="ctr"/>
-            <a:endParaRPr lang="pt-BR"/>
-          </a:p>
-        </p:txBody>
-      </p:sp>
-      <p:sp>
-        <p:nvSpPr>
-          <p:cNvPr id="6" name="Rectangle 5"/>
-          <p:cNvSpPr/>
-          <p:nvPr/>
-        </p:nvSpPr>
-        <p:spPr>
-          <a:xfrm>
-            <a:off x="0" y="6504167"/>
-            <a:ext cx="12192000" cy="353833"/>
-          </a:xfrm>
-          <a:prstGeom prst="rect">
-            <a:avLst/>
-          </a:prstGeom>
-          <a:solidFill>
-            <a:schemeClr val="accent6">
-              <a:lumMod val="50000"/>
-            </a:schemeClr>
-          </a:solidFill>
-        </p:spPr>
-        <p:style>
-          <a:lnRef idx="0">
-            <a:schemeClr val="accent6"/>
-          </a:lnRef>
-          <a:fillRef idx="3">
-            <a:schemeClr val="accent6"/>
-          </a:fillRef>
-          <a:effectRef idx="3">
-            <a:schemeClr val="accent6"/>
-          </a:effectRef>
-          <a:fontRef idx="minor">
-            <a:schemeClr val="lt1"/>
-          </a:fontRef>
-        </p:style>
-        <p:txBody>
-          <a:bodyPr rtlCol="0" anchor="ctr"/>
-          <a:lstStyle/>
-          <a:p>
-            <a:pPr algn="ctr"/>
-            <a:endParaRPr lang="pt-BR"/>
-          </a:p>
-        </p:txBody>
-      </p:sp>
-      <p:sp>
-        <p:nvSpPr>
-          <p:cNvPr id="7" name="TextBox 6"/>
-          <p:cNvSpPr txBox="1"/>
-          <p:nvPr/>
-        </p:nvSpPr>
-        <p:spPr>
-          <a:xfrm>
-            <a:off x="2663687" y="6488668"/>
-            <a:ext cx="1694329" cy="369332"/>
-          </a:xfrm>
-          <a:prstGeom prst="rect">
-            <a:avLst/>
-          </a:prstGeom>
-          <a:noFill/>
-        </p:spPr>
-        <p:txBody>
-          <a:bodyPr wrap="square" rtlCol="0">
-            <a:spAutoFit/>
-          </a:bodyPr>
-          <a:lstStyle/>
-          <a:p>
-            <a:r>
-              <a:rPr lang="pt-BR" b="1" spc="50" dirty="0" smtClean="0">
-                <a:ln w="0"/>
-                <a:solidFill>
-                  <a:schemeClr val="bg1"/>
-                </a:solidFill>
-                <a:effectLst>
-                  <a:innerShdw blurRad="63500" dist="50800" dir="13500000">
-                    <a:srgbClr val="000000">
-                      <a:alpha val="50000"/>
-                    </a:srgbClr>
-                  </a:innerShdw>
-                </a:effectLst>
-                <a:latin typeface="Baskerville Old Face" panose="02020602080505020303" pitchFamily="18" charset="0"/>
-              </a:rPr>
-              <a:t>Hora:</a:t>
-            </a:r>
-            <a:endParaRPr lang="pt-BR" b="1" spc="50" dirty="0">
-              <a:ln w="0"/>
-              <a:solidFill>
-                <a:schemeClr val="bg1"/>
-              </a:solidFill>
-              <a:effectLst>
-                <a:innerShdw blurRad="63500" dist="50800" dir="13500000">
-                  <a:srgbClr val="000000">
-                    <a:alpha val="50000"/>
-                  </a:srgbClr>
-                </a:innerShdw>
-              </a:effectLst>
-              <a:latin typeface="Baskerville Old Face" panose="02020602080505020303" pitchFamily="18" charset="0"/>
-            </a:endParaRPr>
-          </a:p>
-        </p:txBody>
-      </p:sp>
-      <p:sp>
-        <p:nvSpPr>
-          <p:cNvPr id="9" name="TextBox 8"/>
-          <p:cNvSpPr txBox="1"/>
-          <p:nvPr/>
-        </p:nvSpPr>
-        <p:spPr>
-          <a:xfrm>
-            <a:off x="6580678" y="6488668"/>
-            <a:ext cx="1694329" cy="369332"/>
-          </a:xfrm>
-          <a:prstGeom prst="rect">
-            <a:avLst/>
-          </a:prstGeom>
-          <a:noFill/>
-        </p:spPr>
-        <p:txBody>
-          <a:bodyPr wrap="square" rtlCol="0">
-            <a:spAutoFit/>
-          </a:bodyPr>
-          <a:lstStyle/>
-          <a:p>
-            <a:r>
-              <a:rPr lang="pt-BR" b="1" spc="50" dirty="0" smtClean="0">
-                <a:ln w="0"/>
-                <a:solidFill>
-                  <a:schemeClr val="bg1"/>
-                </a:solidFill>
-                <a:effectLst>
-                  <a:innerShdw blurRad="63500" dist="50800" dir="13500000">
-                    <a:srgbClr val="000000">
-                      <a:alpha val="50000"/>
-                    </a:srgbClr>
-                  </a:innerShdw>
-                </a:effectLst>
-                <a:latin typeface="Baskerville Old Face" panose="02020602080505020303" pitchFamily="18" charset="0"/>
-              </a:rPr>
-              <a:t>Data:</a:t>
-            </a:r>
-            <a:endParaRPr lang="pt-BR" b="1" spc="50" dirty="0">
-              <a:ln w="0"/>
-              <a:solidFill>
-                <a:schemeClr val="bg1"/>
-              </a:solidFill>
-              <a:effectLst>
-                <a:innerShdw blurRad="63500" dist="50800" dir="13500000">
-                  <a:srgbClr val="000000">
-                    <a:alpha val="50000"/>
-                  </a:srgbClr>
-                </a:innerShdw>
-              </a:effectLst>
-              <a:latin typeface="Baskerville Old Face" panose="02020602080505020303" pitchFamily="18" charset="0"/>
-            </a:endParaRPr>
-          </a:p>
-        </p:txBody>
-      </p:sp>
-      <p:grpSp>
-        <p:nvGrpSpPr>
-          <p:cNvPr id="36" name="Group 35"/>
-          <p:cNvGrpSpPr/>
-          <p:nvPr/>
-        </p:nvGrpSpPr>
-        <p:grpSpPr>
-          <a:xfrm>
-            <a:off x="8204731" y="4628178"/>
-            <a:ext cx="3472479" cy="1213089"/>
-            <a:chOff x="8207231" y="5161137"/>
-            <a:chExt cx="3472479" cy="1213089"/>
-          </a:xfrm>
-        </p:grpSpPr>
-        <p:pic>
-          <p:nvPicPr>
-            <p:cNvPr id="13" name="Picture 12"/>
-            <p:cNvPicPr>
-              <a:picLocks noChangeAspect="1"/>
-            </p:cNvPicPr>
-            <p:nvPr/>
-          </p:nvPicPr>
-          <p:blipFill>
-            <a:blip r:embed="rId3"/>
-            <a:stretch>
-              <a:fillRect/>
-            </a:stretch>
-          </p:blipFill>
-          <p:spPr>
-            <a:xfrm>
-              <a:off x="8207231" y="5161137"/>
-              <a:ext cx="2114749" cy="1213089"/>
-            </a:xfrm>
-            <a:prstGeom prst="rect">
-              <a:avLst/>
-            </a:prstGeom>
-          </p:spPr>
-        </p:pic>
-        <p:grpSp>
-          <p:nvGrpSpPr>
-            <p:cNvPr id="23" name="Group 22"/>
-            <p:cNvGrpSpPr/>
-            <p:nvPr/>
-          </p:nvGrpSpPr>
-          <p:grpSpPr>
-            <a:xfrm>
-              <a:off x="10526368" y="5254669"/>
-              <a:ext cx="1153342" cy="1026024"/>
-              <a:chOff x="9276520" y="488572"/>
-              <a:chExt cx="1869141" cy="1573306"/>
-            </a:xfrm>
-          </p:grpSpPr>
-          <p:sp>
-            <p:nvSpPr>
-              <p:cNvPr id="24" name="Rounded Rectangle 23"/>
-              <p:cNvSpPr/>
-              <p:nvPr/>
-            </p:nvSpPr>
-            <p:spPr>
-              <a:xfrm>
-                <a:off x="9276520" y="488572"/>
-                <a:ext cx="1869141" cy="1573306"/>
-              </a:xfrm>
-              <a:prstGeom prst="roundRect">
-                <a:avLst/>
-              </a:prstGeom>
-              <a:ln w="76200"/>
-            </p:spPr>
-            <p:style>
-              <a:lnRef idx="2">
-                <a:schemeClr val="accent1"/>
-              </a:lnRef>
-              <a:fillRef idx="1">
-                <a:schemeClr val="lt1"/>
-              </a:fillRef>
-              <a:effectRef idx="0">
-                <a:schemeClr val="accent1"/>
-              </a:effectRef>
-              <a:fontRef idx="minor">
-                <a:schemeClr val="dk1"/>
-              </a:fontRef>
-            </p:style>
-            <p:txBody>
-              <a:bodyPr rtlCol="0" anchor="ctr"/>
-              <a:lstStyle/>
-              <a:p>
-                <a:pPr algn="ctr"/>
-                <a:endParaRPr lang="pt-BR" b="1">
-                  <a:ln w="12700">
-                    <a:solidFill>
-                      <a:schemeClr val="accent3">
-                        <a:lumMod val="50000"/>
-                      </a:schemeClr>
-                    </a:solidFill>
-                    <a:prstDash val="solid"/>
-                  </a:ln>
-                  <a:pattFill prst="narHorz">
-                    <a:fgClr>
-                      <a:schemeClr val="accent3"/>
-                    </a:fgClr>
-                    <a:bgClr>
-                      <a:schemeClr val="accent3">
-                        <a:lumMod val="40000"/>
-                        <a:lumOff val="60000"/>
-                      </a:schemeClr>
-                    </a:bgClr>
-                  </a:pattFill>
-                  <a:effectLst>
-                    <a:innerShdw blurRad="177800">
-                      <a:schemeClr val="accent3">
-                        <a:lumMod val="50000"/>
-                      </a:schemeClr>
-                    </a:innerShdw>
-                  </a:effectLst>
-                </a:endParaRPr>
-              </a:p>
-            </p:txBody>
-          </p:sp>
-          <p:pic>
-            <p:nvPicPr>
-              <p:cNvPr id="25" name="Picture 24"/>
-              <p:cNvPicPr>
-                <a:picLocks noChangeAspect="1"/>
-              </p:cNvPicPr>
-              <p:nvPr/>
-            </p:nvPicPr>
-            <p:blipFill>
-              <a:blip r:embed="rId4"/>
-              <a:stretch>
-                <a:fillRect/>
-              </a:stretch>
-            </p:blipFill>
-            <p:spPr>
-              <a:xfrm>
-                <a:off x="9690390" y="777755"/>
-                <a:ext cx="1041400" cy="1041400"/>
-              </a:xfrm>
-              <a:prstGeom prst="rect">
-                <a:avLst/>
-              </a:prstGeom>
-              <a:ln w="76200">
-                <a:noFill/>
-              </a:ln>
-            </p:spPr>
-          </p:pic>
-        </p:grpSp>
-      </p:grpSp>
-      <p:grpSp>
-        <p:nvGrpSpPr>
-          <p:cNvPr id="28" name="Group 27"/>
-          <p:cNvGrpSpPr/>
-          <p:nvPr/>
-        </p:nvGrpSpPr>
-        <p:grpSpPr>
-          <a:xfrm>
-            <a:off x="8601442" y="3285887"/>
-            <a:ext cx="1324108" cy="1039370"/>
-            <a:chOff x="1331259" y="699247"/>
-            <a:chExt cx="1869141" cy="1573306"/>
-          </a:xfrm>
-        </p:grpSpPr>
-        <p:sp>
-          <p:nvSpPr>
-            <p:cNvPr id="31" name="Rounded Rectangle 30"/>
-            <p:cNvSpPr/>
-            <p:nvPr/>
-          </p:nvSpPr>
-          <p:spPr>
-            <a:xfrm>
-              <a:off x="1331259" y="699247"/>
-              <a:ext cx="1869141" cy="1573306"/>
-            </a:xfrm>
-            <a:prstGeom prst="roundRect">
-              <a:avLst/>
-            </a:prstGeom>
-          </p:spPr>
-          <p:style>
-            <a:lnRef idx="0">
-              <a:schemeClr val="accent6"/>
-            </a:lnRef>
-            <a:fillRef idx="3">
-              <a:schemeClr val="accent6"/>
-            </a:fillRef>
-            <a:effectRef idx="3">
-              <a:schemeClr val="accent6"/>
-            </a:effectRef>
-            <a:fontRef idx="minor">
-              <a:schemeClr val="lt1"/>
-            </a:fontRef>
-          </p:style>
-          <p:txBody>
-            <a:bodyPr rtlCol="0" anchor="ctr"/>
-            <a:lstStyle/>
-            <a:p>
-              <a:pPr algn="ctr"/>
-              <a:endParaRPr lang="pt-BR" b="1">
-                <a:ln w="12700">
-                  <a:solidFill>
-                    <a:schemeClr val="accent3">
-                      <a:lumMod val="50000"/>
-                    </a:schemeClr>
-                  </a:solidFill>
-                  <a:prstDash val="solid"/>
-                </a:ln>
-                <a:pattFill prst="narHorz">
-                  <a:fgClr>
-                    <a:schemeClr val="accent3"/>
-                  </a:fgClr>
-                  <a:bgClr>
-                    <a:schemeClr val="accent3">
-                      <a:lumMod val="40000"/>
-                      <a:lumOff val="60000"/>
-                    </a:schemeClr>
-                  </a:bgClr>
-                </a:pattFill>
-                <a:effectLst>
-                  <a:innerShdw blurRad="177800">
-                    <a:schemeClr val="accent3">
-                      <a:lumMod val="50000"/>
-                    </a:schemeClr>
-                  </a:innerShdw>
-                </a:effectLst>
-              </a:endParaRPr>
-            </a:p>
-          </p:txBody>
-        </p:sp>
-        <p:sp>
-          <p:nvSpPr>
-            <p:cNvPr id="32" name="TextBox 31"/>
-            <p:cNvSpPr txBox="1"/>
-            <p:nvPr/>
-          </p:nvSpPr>
-          <p:spPr>
-            <a:xfrm>
-              <a:off x="1656448" y="1802011"/>
-              <a:ext cx="1218761" cy="369332"/>
-            </a:xfrm>
-            <a:prstGeom prst="rect">
-              <a:avLst/>
-            </a:prstGeom>
-            <a:noFill/>
-          </p:spPr>
-          <p:txBody>
-            <a:bodyPr wrap="square" rtlCol="0">
-              <a:spAutoFit/>
-            </a:bodyPr>
-            <a:lstStyle/>
-            <a:p>
-              <a:pPr algn="ctr"/>
-              <a:endParaRPr lang="pt-BR" dirty="0">
-                <a:solidFill>
-                  <a:schemeClr val="bg1"/>
-                </a:solidFill>
-                <a:latin typeface="Copperplate Gothic Bold" panose="020E0705020206020404" pitchFamily="34" charset="0"/>
-              </a:endParaRPr>
-            </a:p>
-          </p:txBody>
-        </p:sp>
-      </p:grpSp>
-      <p:grpSp>
-        <p:nvGrpSpPr>
-          <p:cNvPr id="35" name="Group 34"/>
-          <p:cNvGrpSpPr/>
-          <p:nvPr/>
-        </p:nvGrpSpPr>
-        <p:grpSpPr>
-          <a:xfrm>
-            <a:off x="10453306" y="3292487"/>
-            <a:ext cx="1324108" cy="1039370"/>
-            <a:chOff x="10218737" y="3285887"/>
-            <a:chExt cx="1324108" cy="1039370"/>
-          </a:xfrm>
-        </p:grpSpPr>
-        <p:grpSp>
-          <p:nvGrpSpPr>
-            <p:cNvPr id="27" name="Group 26"/>
-            <p:cNvGrpSpPr/>
-            <p:nvPr/>
-          </p:nvGrpSpPr>
-          <p:grpSpPr>
-            <a:xfrm>
-              <a:off x="10218737" y="3285887"/>
-              <a:ext cx="1324108" cy="1039370"/>
-              <a:chOff x="3931024" y="699247"/>
-              <a:chExt cx="1869141" cy="1573306"/>
-            </a:xfrm>
-          </p:grpSpPr>
-          <p:sp>
-            <p:nvSpPr>
-              <p:cNvPr id="33" name="Rounded Rectangle 32"/>
-              <p:cNvSpPr/>
-              <p:nvPr/>
-            </p:nvSpPr>
-            <p:spPr>
-              <a:xfrm>
-                <a:off x="3931024" y="699247"/>
-                <a:ext cx="1869141" cy="1573306"/>
-              </a:xfrm>
-              <a:prstGeom prst="roundRect">
-                <a:avLst/>
-              </a:prstGeom>
-            </p:spPr>
-            <p:style>
-              <a:lnRef idx="0">
-                <a:schemeClr val="accent6"/>
-              </a:lnRef>
-              <a:fillRef idx="3">
-                <a:schemeClr val="accent6"/>
-              </a:fillRef>
-              <a:effectRef idx="3">
-                <a:schemeClr val="accent6"/>
-              </a:effectRef>
-              <a:fontRef idx="minor">
-                <a:schemeClr val="lt1"/>
-              </a:fontRef>
-            </p:style>
-            <p:txBody>
-              <a:bodyPr rtlCol="0" anchor="ctr"/>
-              <a:lstStyle/>
-              <a:p>
-                <a:pPr algn="ctr"/>
-                <a:endParaRPr lang="pt-BR" b="1">
-                  <a:ln w="12700">
-                    <a:solidFill>
-                      <a:schemeClr val="accent3">
-                        <a:lumMod val="50000"/>
-                      </a:schemeClr>
-                    </a:solidFill>
-                    <a:prstDash val="solid"/>
-                  </a:ln>
-                  <a:pattFill prst="narHorz">
-                    <a:fgClr>
-                      <a:schemeClr val="accent3"/>
-                    </a:fgClr>
-                    <a:bgClr>
-                      <a:schemeClr val="accent3">
-                        <a:lumMod val="40000"/>
-                        <a:lumOff val="60000"/>
-                      </a:schemeClr>
-                    </a:bgClr>
-                  </a:pattFill>
-                  <a:effectLst>
-                    <a:innerShdw blurRad="177800">
-                      <a:schemeClr val="accent3">
-                        <a:lumMod val="50000"/>
-                      </a:schemeClr>
-                    </a:innerShdw>
-                  </a:effectLst>
-                </a:endParaRPr>
-              </a:p>
-            </p:txBody>
-          </p:sp>
-          <p:sp>
-            <p:nvSpPr>
-              <p:cNvPr id="34" name="TextBox 33"/>
-              <p:cNvSpPr txBox="1"/>
-              <p:nvPr/>
-            </p:nvSpPr>
-            <p:spPr>
-              <a:xfrm>
-                <a:off x="4047565" y="1802011"/>
-                <a:ext cx="1600200" cy="276999"/>
-              </a:xfrm>
-              <a:prstGeom prst="rect">
-                <a:avLst/>
-              </a:prstGeom>
-              <a:noFill/>
-            </p:spPr>
-            <p:txBody>
-              <a:bodyPr wrap="square" rtlCol="0">
-                <a:spAutoFit/>
-              </a:bodyPr>
-              <a:lstStyle/>
-              <a:p>
-                <a:pPr algn="ctr"/>
-                <a:endParaRPr lang="pt-BR" sz="1200" dirty="0">
-                  <a:solidFill>
-                    <a:schemeClr val="bg1"/>
-                  </a:solidFill>
-                  <a:latin typeface="Copperplate Gothic Bold" panose="020E0705020206020404" pitchFamily="34" charset="0"/>
-                </a:endParaRPr>
-              </a:p>
-            </p:txBody>
-          </p:sp>
-        </p:grpSp>
-        <p:pic>
-          <p:nvPicPr>
-            <p:cNvPr id="29" name="Picture 28"/>
-            <p:cNvPicPr>
-              <a:picLocks noChangeAspect="1"/>
-            </p:cNvPicPr>
-            <p:nvPr/>
-          </p:nvPicPr>
-          <p:blipFill>
-            <a:blip r:embed="rId5">
-              <a:extLst>
-                <a:ext uri="{28A0092B-C50C-407E-A947-70E740481C1C}">
-                  <a14:useLocalDpi xmlns:a14="http://schemas.microsoft.com/office/drawing/2010/main" val="0"/>
-                </a:ext>
-              </a:extLst>
-            </a:blip>
-            <a:stretch>
-              <a:fillRect/>
-            </a:stretch>
-          </p:blipFill>
-          <p:spPr>
-            <a:xfrm>
-              <a:off x="10510639" y="3430732"/>
-              <a:ext cx="808119" cy="753618"/>
-            </a:xfrm>
-            <a:prstGeom prst="rect">
-              <a:avLst/>
-            </a:prstGeom>
-          </p:spPr>
-        </p:pic>
-      </p:grpSp>
-      <p:pic>
-        <p:nvPicPr>
-          <p:cNvPr id="30" name="Picture 29"/>
-          <p:cNvPicPr>
-            <a:picLocks noChangeAspect="1"/>
-          </p:cNvPicPr>
-          <p:nvPr/>
-        </p:nvPicPr>
-        <p:blipFill>
-          <a:blip r:embed="rId6">
-            <a:extLst>
-              <a:ext uri="{28A0092B-C50C-407E-A947-70E740481C1C}">
-                <a14:useLocalDpi xmlns:a14="http://schemas.microsoft.com/office/drawing/2010/main" val="0"/>
-              </a:ext>
-            </a:extLst>
-          </a:blip>
-          <a:stretch>
-            <a:fillRect/>
-          </a:stretch>
-        </p:blipFill>
-        <p:spPr>
-          <a:xfrm>
-            <a:off x="8826375" y="3430732"/>
-            <a:ext cx="874239" cy="815278"/>
-          </a:xfrm>
-          <a:prstGeom prst="rect">
-            <a:avLst/>
-          </a:prstGeom>
-        </p:spPr>
-      </p:pic>
-      <p:grpSp>
-        <p:nvGrpSpPr>
-          <p:cNvPr id="54" name="Group 53"/>
-          <p:cNvGrpSpPr/>
-          <p:nvPr/>
-        </p:nvGrpSpPr>
-        <p:grpSpPr>
-          <a:xfrm>
-            <a:off x="8275006" y="643651"/>
-            <a:ext cx="4269457" cy="2793681"/>
-            <a:chOff x="543662" y="1802011"/>
-            <a:chExt cx="6357419" cy="4633458"/>
-          </a:xfrm>
-        </p:grpSpPr>
-        <p:grpSp>
-          <p:nvGrpSpPr>
-            <p:cNvPr id="55" name="Group 54"/>
-            <p:cNvGrpSpPr/>
-            <p:nvPr/>
-          </p:nvGrpSpPr>
-          <p:grpSpPr>
-            <a:xfrm>
-              <a:off x="1148557" y="1819155"/>
-              <a:ext cx="1869141" cy="1573306"/>
-              <a:chOff x="1331259" y="699247"/>
-              <a:chExt cx="1869141" cy="1573306"/>
-            </a:xfrm>
-          </p:grpSpPr>
-          <p:grpSp>
-            <p:nvGrpSpPr>
-              <p:cNvPr id="67" name="Group 66"/>
-              <p:cNvGrpSpPr/>
-              <p:nvPr/>
-            </p:nvGrpSpPr>
-            <p:grpSpPr>
-              <a:xfrm>
-                <a:off x="1331259" y="699247"/>
-                <a:ext cx="1869141" cy="1573306"/>
-                <a:chOff x="1331259" y="699247"/>
-                <a:chExt cx="1869141" cy="1573306"/>
-              </a:xfrm>
-            </p:grpSpPr>
-            <p:sp>
-              <p:nvSpPr>
-                <p:cNvPr id="69" name="Rounded Rectangle 68"/>
-                <p:cNvSpPr/>
-                <p:nvPr/>
-              </p:nvSpPr>
-              <p:spPr>
-                <a:xfrm>
-                  <a:off x="1331259" y="699247"/>
-                  <a:ext cx="1869141" cy="1573306"/>
-                </a:xfrm>
-                <a:prstGeom prst="roundRect">
-                  <a:avLst/>
-                </a:prstGeom>
-              </p:spPr>
-              <p:style>
-                <a:lnRef idx="0">
-                  <a:schemeClr val="accent6"/>
-                </a:lnRef>
-                <a:fillRef idx="3">
-                  <a:schemeClr val="accent6"/>
-                </a:fillRef>
-                <a:effectRef idx="3">
-                  <a:schemeClr val="accent6"/>
-                </a:effectRef>
-                <a:fontRef idx="minor">
-                  <a:schemeClr val="lt1"/>
-                </a:fontRef>
-              </p:style>
-              <p:txBody>
-                <a:bodyPr rtlCol="0" anchor="ctr"/>
-                <a:lstStyle/>
-                <a:p>
-                  <a:pPr algn="ctr"/>
-                  <a:endParaRPr lang="pt-BR" b="1">
-                    <a:ln w="12700">
-                      <a:solidFill>
-                        <a:schemeClr val="accent3">
-                          <a:lumMod val="50000"/>
-                        </a:schemeClr>
-                      </a:solidFill>
-                      <a:prstDash val="solid"/>
-                    </a:ln>
-                    <a:pattFill prst="narHorz">
-                      <a:fgClr>
-                        <a:schemeClr val="accent3"/>
-                      </a:fgClr>
-                      <a:bgClr>
-                        <a:schemeClr val="accent3">
-                          <a:lumMod val="40000"/>
-                          <a:lumOff val="60000"/>
-                        </a:schemeClr>
-                      </a:bgClr>
-                    </a:pattFill>
-                    <a:effectLst>
-                      <a:innerShdw blurRad="177800">
-                        <a:schemeClr val="accent3">
-                          <a:lumMod val="50000"/>
-                        </a:schemeClr>
-                      </a:innerShdw>
-                    </a:effectLst>
-                  </a:endParaRPr>
-                </a:p>
-              </p:txBody>
-            </p:sp>
-            <p:sp>
-              <p:nvSpPr>
-                <p:cNvPr id="70" name="TextBox 69"/>
-                <p:cNvSpPr txBox="1"/>
-                <p:nvPr/>
-              </p:nvSpPr>
-              <p:spPr>
-                <a:xfrm>
-                  <a:off x="1656448" y="1802011"/>
-                  <a:ext cx="1218761" cy="369332"/>
-                </a:xfrm>
-                <a:prstGeom prst="rect">
-                  <a:avLst/>
-                </a:prstGeom>
-                <a:noFill/>
-              </p:spPr>
-              <p:txBody>
-                <a:bodyPr wrap="square" rtlCol="0">
-                  <a:spAutoFit/>
-                </a:bodyPr>
-                <a:lstStyle/>
-                <a:p>
-                  <a:pPr algn="ctr"/>
-                  <a:endParaRPr lang="pt-BR" dirty="0">
-                    <a:solidFill>
-                      <a:schemeClr val="bg1"/>
-                    </a:solidFill>
-                    <a:latin typeface="Copperplate Gothic Bold" panose="020E0705020206020404" pitchFamily="34" charset="0"/>
-                  </a:endParaRPr>
-                </a:p>
-              </p:txBody>
-            </p:sp>
-          </p:grpSp>
-          <p:pic>
-            <p:nvPicPr>
-              <p:cNvPr id="68" name="Picture 67"/>
-              <p:cNvPicPr>
-                <a:picLocks noChangeAspect="1"/>
-              </p:cNvPicPr>
-              <p:nvPr/>
-            </p:nvPicPr>
-            <p:blipFill>
-              <a:blip r:embed="rId7">
-                <a:clrChange>
-                  <a:clrFrom>
-                    <a:srgbClr val="000000"/>
-                  </a:clrFrom>
-                  <a:clrTo>
-                    <a:srgbClr val="000000">
-                      <a:alpha val="0"/>
-                    </a:srgbClr>
-                  </a:clrTo>
-                </a:clrChange>
-              </a:blip>
-              <a:stretch>
-                <a:fillRect/>
-              </a:stretch>
-            </p:blipFill>
-            <p:spPr>
-              <a:xfrm>
-                <a:off x="1554628" y="843399"/>
-                <a:ext cx="1422400" cy="1327944"/>
-              </a:xfrm>
-              <a:prstGeom prst="rect">
-                <a:avLst/>
-              </a:prstGeom>
-            </p:spPr>
-          </p:pic>
-        </p:grpSp>
-        <p:grpSp>
-          <p:nvGrpSpPr>
-            <p:cNvPr id="56" name="Group 55"/>
-            <p:cNvGrpSpPr/>
-            <p:nvPr/>
-          </p:nvGrpSpPr>
-          <p:grpSpPr>
-            <a:xfrm>
-              <a:off x="3807901" y="1802011"/>
-              <a:ext cx="1869141" cy="1573306"/>
-              <a:chOff x="3614270" y="699247"/>
-              <a:chExt cx="1869141" cy="1573306"/>
-            </a:xfrm>
-          </p:grpSpPr>
-          <p:grpSp>
-            <p:nvGrpSpPr>
-              <p:cNvPr id="63" name="Group 62"/>
-              <p:cNvGrpSpPr/>
-              <p:nvPr/>
-            </p:nvGrpSpPr>
-            <p:grpSpPr>
-              <a:xfrm>
-                <a:off x="3614270" y="699247"/>
-                <a:ext cx="1869141" cy="1573306"/>
-                <a:chOff x="3931024" y="699247"/>
-                <a:chExt cx="1869141" cy="1573306"/>
-              </a:xfrm>
-            </p:grpSpPr>
-            <p:sp>
-              <p:nvSpPr>
-                <p:cNvPr id="65" name="Rounded Rectangle 64"/>
-                <p:cNvSpPr/>
-                <p:nvPr/>
-              </p:nvSpPr>
-              <p:spPr>
-                <a:xfrm>
-                  <a:off x="3931024" y="699247"/>
-                  <a:ext cx="1869141" cy="1573306"/>
-                </a:xfrm>
-                <a:prstGeom prst="roundRect">
-                  <a:avLst/>
-                </a:prstGeom>
-              </p:spPr>
-              <p:style>
-                <a:lnRef idx="0">
-                  <a:schemeClr val="accent6"/>
-                </a:lnRef>
-                <a:fillRef idx="3">
-                  <a:schemeClr val="accent6"/>
-                </a:fillRef>
-                <a:effectRef idx="3">
-                  <a:schemeClr val="accent6"/>
-                </a:effectRef>
-                <a:fontRef idx="minor">
-                  <a:schemeClr val="lt1"/>
-                </a:fontRef>
-              </p:style>
-              <p:txBody>
-                <a:bodyPr rtlCol="0" anchor="ctr"/>
-                <a:lstStyle/>
-                <a:p>
-                  <a:pPr algn="ctr"/>
-                  <a:endParaRPr lang="pt-BR" b="1">
-                    <a:ln w="12700">
-                      <a:solidFill>
-                        <a:schemeClr val="accent3">
-                          <a:lumMod val="50000"/>
-                        </a:schemeClr>
-                      </a:solidFill>
-                      <a:prstDash val="solid"/>
-                    </a:ln>
-                    <a:pattFill prst="narHorz">
-                      <a:fgClr>
-                        <a:schemeClr val="accent3"/>
-                      </a:fgClr>
-                      <a:bgClr>
-                        <a:schemeClr val="accent3">
-                          <a:lumMod val="40000"/>
-                          <a:lumOff val="60000"/>
-                        </a:schemeClr>
-                      </a:bgClr>
-                    </a:pattFill>
-                    <a:effectLst>
-                      <a:innerShdw blurRad="177800">
-                        <a:schemeClr val="accent3">
-                          <a:lumMod val="50000"/>
-                        </a:schemeClr>
-                      </a:innerShdw>
-                    </a:effectLst>
-                  </a:endParaRPr>
-                </a:p>
-              </p:txBody>
-            </p:sp>
-            <p:sp>
-              <p:nvSpPr>
-                <p:cNvPr id="66" name="TextBox 65"/>
-                <p:cNvSpPr txBox="1"/>
-                <p:nvPr/>
-              </p:nvSpPr>
-              <p:spPr>
-                <a:xfrm>
-                  <a:off x="4047565" y="1802011"/>
-                  <a:ext cx="1600200" cy="276999"/>
-                </a:xfrm>
-                <a:prstGeom prst="rect">
-                  <a:avLst/>
-                </a:prstGeom>
-                <a:noFill/>
-              </p:spPr>
-              <p:txBody>
-                <a:bodyPr wrap="square" rtlCol="0">
-                  <a:spAutoFit/>
-                </a:bodyPr>
-                <a:lstStyle/>
-                <a:p>
-                  <a:pPr algn="ctr"/>
-                  <a:endParaRPr lang="pt-BR" sz="1200" dirty="0">
-                    <a:solidFill>
-                      <a:schemeClr val="bg1"/>
-                    </a:solidFill>
-                    <a:latin typeface="Copperplate Gothic Bold" panose="020E0705020206020404" pitchFamily="34" charset="0"/>
-                  </a:endParaRPr>
-                </a:p>
-              </p:txBody>
-            </p:sp>
-          </p:grpSp>
-          <p:pic>
-            <p:nvPicPr>
-              <p:cNvPr id="64" name="Picture 63"/>
-              <p:cNvPicPr>
-                <a:picLocks noChangeAspect="1"/>
-              </p:cNvPicPr>
-              <p:nvPr/>
-            </p:nvPicPr>
-            <p:blipFill>
-              <a:blip r:embed="rId8">
-                <a:clrChange>
-                  <a:clrFrom>
-                    <a:srgbClr val="000000"/>
-                  </a:clrFrom>
-                  <a:clrTo>
-                    <a:srgbClr val="000000">
-                      <a:alpha val="0"/>
-                    </a:srgbClr>
-                  </a:clrTo>
-                </a:clrChange>
-              </a:blip>
-              <a:stretch>
-                <a:fillRect/>
-              </a:stretch>
-            </p:blipFill>
-            <p:spPr>
-              <a:xfrm>
-                <a:off x="3730811" y="777755"/>
-                <a:ext cx="1554149" cy="1301255"/>
-              </a:xfrm>
-              <a:prstGeom prst="rect">
-                <a:avLst/>
-              </a:prstGeom>
-            </p:spPr>
-          </p:pic>
-        </p:grpSp>
-        <p:grpSp>
-          <p:nvGrpSpPr>
-            <p:cNvPr id="57" name="Group 56"/>
-            <p:cNvGrpSpPr/>
-            <p:nvPr/>
-          </p:nvGrpSpPr>
-          <p:grpSpPr>
-            <a:xfrm>
-              <a:off x="3307167" y="3239047"/>
-              <a:ext cx="3593914" cy="3180556"/>
-              <a:chOff x="3488003" y="3296809"/>
-              <a:chExt cx="3593914" cy="3180556"/>
-            </a:xfrm>
-          </p:grpSpPr>
-          <p:pic>
-            <p:nvPicPr>
-              <p:cNvPr id="61" name="Picture 60"/>
-              <p:cNvPicPr>
-                <a:picLocks noChangeAspect="1"/>
-              </p:cNvPicPr>
-              <p:nvPr/>
-            </p:nvPicPr>
-            <p:blipFill>
-              <a:blip r:embed="rId9">
-                <a:clrChange>
-                  <a:clrFrom>
-                    <a:srgbClr val="FFFFFF"/>
-                  </a:clrFrom>
-                  <a:clrTo>
-                    <a:srgbClr val="FFFFFF">
-                      <a:alpha val="0"/>
-                    </a:srgbClr>
-                  </a:clrTo>
-                </a:clrChange>
-                <a:duotone>
-                  <a:schemeClr val="accent6">
-                    <a:shade val="45000"/>
-                    <a:satMod val="135000"/>
-                  </a:schemeClr>
-                  <a:prstClr val="white"/>
-                </a:duotone>
-              </a:blip>
-              <a:stretch>
-                <a:fillRect/>
-              </a:stretch>
-            </p:blipFill>
-            <p:spPr>
-              <a:xfrm>
-                <a:off x="3488003" y="3296809"/>
-                <a:ext cx="3593914" cy="3180556"/>
-              </a:xfrm>
-              <a:prstGeom prst="rect">
-                <a:avLst/>
-              </a:prstGeom>
-            </p:spPr>
-          </p:pic>
-          <p:pic>
-            <p:nvPicPr>
-              <p:cNvPr id="62" name="Picture 61"/>
-              <p:cNvPicPr>
-                <a:picLocks noChangeAspect="1"/>
-              </p:cNvPicPr>
-              <p:nvPr/>
-            </p:nvPicPr>
-            <p:blipFill>
-              <a:blip r:embed="rId10"/>
-              <a:stretch>
-                <a:fillRect/>
-              </a:stretch>
-            </p:blipFill>
-            <p:spPr>
-              <a:xfrm>
-                <a:off x="4214946" y="3872523"/>
-                <a:ext cx="1268465" cy="1059542"/>
-              </a:xfrm>
-              <a:prstGeom prst="rect">
-                <a:avLst/>
-              </a:prstGeom>
-            </p:spPr>
-          </p:pic>
-        </p:grpSp>
-        <p:grpSp>
-          <p:nvGrpSpPr>
-            <p:cNvPr id="58" name="Group 57"/>
-            <p:cNvGrpSpPr/>
-            <p:nvPr/>
-          </p:nvGrpSpPr>
-          <p:grpSpPr>
-            <a:xfrm>
-              <a:off x="543662" y="3253081"/>
-              <a:ext cx="3596952" cy="3182388"/>
-              <a:chOff x="543662" y="3253081"/>
-              <a:chExt cx="3596952" cy="3182388"/>
-            </a:xfrm>
-          </p:grpSpPr>
-          <p:pic>
-            <p:nvPicPr>
-              <p:cNvPr id="59" name="Picture 58"/>
-              <p:cNvPicPr>
-                <a:picLocks noChangeAspect="1"/>
-              </p:cNvPicPr>
-              <p:nvPr/>
-            </p:nvPicPr>
-            <p:blipFill>
-              <a:blip r:embed="rId11"/>
-              <a:stretch>
-                <a:fillRect/>
-              </a:stretch>
-            </p:blipFill>
-            <p:spPr>
-              <a:xfrm>
-                <a:off x="543662" y="3253081"/>
-                <a:ext cx="3596952" cy="3182388"/>
-              </a:xfrm>
-              <a:prstGeom prst="rect">
-                <a:avLst/>
-              </a:prstGeom>
-            </p:spPr>
-          </p:pic>
-          <p:pic>
-            <p:nvPicPr>
-              <p:cNvPr id="60" name="Picture 59"/>
-              <p:cNvPicPr>
-                <a:picLocks noChangeAspect="1"/>
-              </p:cNvPicPr>
-              <p:nvPr/>
-            </p:nvPicPr>
-            <p:blipFill>
-              <a:blip r:embed="rId7">
-                <a:clrChange>
-                  <a:clrFrom>
-                    <a:srgbClr val="000000"/>
-                  </a:clrFrom>
-                  <a:clrTo>
-                    <a:srgbClr val="000000">
-                      <a:alpha val="0"/>
-                    </a:srgbClr>
-                  </a:clrTo>
-                </a:clrChange>
-              </a:blip>
-              <a:stretch>
-                <a:fillRect/>
-              </a:stretch>
-            </p:blipFill>
-            <p:spPr>
-              <a:xfrm>
-                <a:off x="1331259" y="3872523"/>
-                <a:ext cx="1043216" cy="973940"/>
-              </a:xfrm>
-              <a:prstGeom prst="rect">
-                <a:avLst/>
-              </a:prstGeom>
-            </p:spPr>
-          </p:pic>
-        </p:grpSp>
-      </p:grpSp>
-    </p:spTree>
-    <p:extLst>
-      <p:ext uri="{BB962C8B-B14F-4D97-AF65-F5344CB8AC3E}">
-        <p14:creationId xmlns:p14="http://schemas.microsoft.com/office/powerpoint/2010/main" val="505509852"/>
-      </p:ext>
-    </p:extLst>
-  </p:cSld>
-  <p:clrMapOvr>
-    <a:masterClrMapping/>
-  </p:clrMapOvr>
-  <p:timing>
-    <p:tnLst>
-      <p:par>
-        <p:cTn id="1" dur="indefinite" restart="never" nodeType="tmRoot"/>
-      </p:par>
-    </p:tnLst>
-  </p:timing>
-</p:sld>
-</file>
-
-<file path=ppt/slides/slide6.xml><?xml version="1.0" encoding="utf-8"?>
-<p:sld xmlns:a="http://schemas.openxmlformats.org/drawingml/2006/main" xmlns:r="http://schemas.openxmlformats.org/officeDocument/2006/relationships" xmlns:p="http://schemas.openxmlformats.org/presentationml/2006/main">
-  <p:cSld>
-    <p:bg>
-      <p:bgPr>
         <a:gradFill flip="none" rotWithShape="1">
           <a:gsLst>
             <a:gs pos="0">
@@ -11429,6 +10022,30 @@
           </p:pic>
         </p:grpSp>
       </p:grpSp>
+      <p:pic>
+        <p:nvPicPr>
+          <p:cNvPr id="8" name="Picture 7"/>
+          <p:cNvPicPr>
+            <a:picLocks noChangeAspect="1"/>
+          </p:cNvPicPr>
+          <p:nvPr/>
+        </p:nvPicPr>
+        <p:blipFill>
+          <a:blip r:embed="rId10"/>
+          <a:stretch>
+            <a:fillRect/>
+          </a:stretch>
+        </p:blipFill>
+        <p:spPr>
+          <a:xfrm>
+            <a:off x="11486557" y="40514"/>
+            <a:ext cx="365792" cy="134124"/>
+          </a:xfrm>
+          <a:prstGeom prst="rect">
+            <a:avLst/>
+          </a:prstGeom>
+        </p:spPr>
+      </p:pic>
     </p:spTree>
     <p:extLst>
       <p:ext uri="{BB962C8B-B14F-4D97-AF65-F5344CB8AC3E}">
@@ -11449,7 +10066,7 @@
 </p:sld>
 </file>
 
-<file path=ppt/slides/slide7.xml><?xml version="1.0" encoding="utf-8"?>
+<file path=ppt/slides/slide6.xml><?xml version="1.0" encoding="utf-8"?>
 <p:sld xmlns:a="http://schemas.openxmlformats.org/drawingml/2006/main" xmlns:r="http://schemas.openxmlformats.org/officeDocument/2006/relationships" xmlns:p="http://schemas.openxmlformats.org/presentationml/2006/main">
   <p:cSld>
     <p:bg>
@@ -12064,7 +10681,7 @@
 </p:sld>
 </file>
 
-<file path=ppt/slides/slide8.xml><?xml version="1.0" encoding="utf-8"?>
+<file path=ppt/slides/slide7.xml><?xml version="1.0" encoding="utf-8"?>
 <p:sld xmlns:a="http://schemas.openxmlformats.org/drawingml/2006/main" xmlns:r="http://schemas.openxmlformats.org/officeDocument/2006/relationships" xmlns:p="http://schemas.openxmlformats.org/presentationml/2006/main">
   <p:cSld>
     <p:bg>
@@ -12768,7 +11385,7 @@
 </p:sld>
 </file>
 
-<file path=ppt/slides/slide9.xml><?xml version="1.0" encoding="utf-8"?>
+<file path=ppt/slides/slide8.xml><?xml version="1.0" encoding="utf-8"?>
 <p:sld xmlns:a="http://schemas.openxmlformats.org/drawingml/2006/main" xmlns:r="http://schemas.openxmlformats.org/officeDocument/2006/relationships" xmlns:p="http://schemas.openxmlformats.org/presentationml/2006/main">
   <p:cSld>
     <p:spTree>
@@ -14056,6 +12673,111 @@
 </p:sld>
 </file>
 
+<file path=ppt/slides/slide9.xml><?xml version="1.0" encoding="utf-8"?>
+<p:sld xmlns:a="http://schemas.openxmlformats.org/drawingml/2006/main" xmlns:r="http://schemas.openxmlformats.org/officeDocument/2006/relationships" xmlns:p="http://schemas.openxmlformats.org/presentationml/2006/main">
+  <p:cSld>
+    <p:bg>
+      <p:bgPr>
+        <a:gradFill flip="none" rotWithShape="1">
+          <a:gsLst>
+            <a:gs pos="0">
+              <a:schemeClr val="accent6">
+                <a:lumMod val="67000"/>
+              </a:schemeClr>
+            </a:gs>
+            <a:gs pos="48000">
+              <a:schemeClr val="accent6">
+                <a:lumMod val="97000"/>
+                <a:lumOff val="3000"/>
+              </a:schemeClr>
+            </a:gs>
+            <a:gs pos="100000">
+              <a:schemeClr val="accent6">
+                <a:lumMod val="60000"/>
+                <a:lumOff val="40000"/>
+              </a:schemeClr>
+            </a:gs>
+          </a:gsLst>
+          <a:path path="circle">
+            <a:fillToRect l="100000" t="100000"/>
+          </a:path>
+          <a:tileRect r="-100000" b="-100000"/>
+        </a:gradFill>
+        <a:effectLst/>
+      </p:bgPr>
+    </p:bg>
+    <p:spTree>
+      <p:nvGrpSpPr>
+        <p:cNvPr id="1" name=""/>
+        <p:cNvGrpSpPr/>
+        <p:nvPr/>
+      </p:nvGrpSpPr>
+      <p:grpSpPr>
+        <a:xfrm>
+          <a:off x="0" y="0"/>
+          <a:ext cx="0" cy="0"/>
+          <a:chOff x="0" y="0"/>
+          <a:chExt cx="0" cy="0"/>
+        </a:xfrm>
+      </p:grpSpPr>
+      <p:sp>
+        <p:nvSpPr>
+          <p:cNvPr id="2" name="Title 1"/>
+          <p:cNvSpPr>
+            <a:spLocks noGrp="1"/>
+          </p:cNvSpPr>
+          <p:nvPr>
+            <p:ph type="title"/>
+          </p:nvPr>
+        </p:nvSpPr>
+        <p:spPr/>
+        <p:txBody>
+          <a:bodyPr/>
+          <a:lstStyle/>
+          <a:p>
+            <a:endParaRPr lang="pt-BR"/>
+          </a:p>
+        </p:txBody>
+      </p:sp>
+      <p:sp>
+        <p:nvSpPr>
+          <p:cNvPr id="3" name="Content Placeholder 2"/>
+          <p:cNvSpPr>
+            <a:spLocks noGrp="1"/>
+          </p:cNvSpPr>
+          <p:nvPr>
+            <p:ph idx="1"/>
+          </p:nvPr>
+        </p:nvSpPr>
+        <p:spPr/>
+        <p:txBody>
+          <a:bodyPr/>
+          <a:lstStyle/>
+          <a:p>
+            <a:endParaRPr lang="pt-BR"/>
+          </a:p>
+        </p:txBody>
+      </p:sp>
+    </p:spTree>
+    <p:extLst>
+      <p:ext uri="{BB962C8B-B14F-4D97-AF65-F5344CB8AC3E}">
+        <p14:creationId xmlns:p14="http://schemas.microsoft.com/office/powerpoint/2010/main" val="3414705876"/>
+      </p:ext>
+    </p:extLst>
+  </p:cSld>
+  <p:clrMapOvr>
+    <a:masterClrMapping/>
+  </p:clrMapOvr>
+  <p:timing>
+    <p:tnLst>
+      <p:par>
+        <p:cTn id="1" dur="indefinite" restart="never" nodeType="tmRoot"/>
+      </p:par>
+    </p:tnLst>
+  </p:timing>
+</p:sld>
+</file>
+
 <file path=ppt/theme/theme1.xml><?xml version="1.0" encoding="utf-8"?>
 <a:theme xmlns:a="http://schemas.openxmlformats.org/drawingml/2006/main" name="Office Theme">
   <a:themeElements>

</xml_diff>